<commit_message>
Split data (test-,train, validation) by exectuion
</commit_message>
<xml_diff>
--- a/02. Presentations/NN_tuning_Process.pptx
+++ b/02. Presentations/NN_tuning_Process.pptx
@@ -6,14 +6,15 @@
     <p:sldMasterId id="2147483694" r:id="rId5"/>
   </p:sldMasterIdLst>
   <p:notesMasterIdLst>
-    <p:notesMasterId r:id="rId8"/>
+    <p:notesMasterId r:id="rId9"/>
   </p:notesMasterIdLst>
   <p:handoutMasterIdLst>
-    <p:handoutMasterId r:id="rId9"/>
+    <p:handoutMasterId r:id="rId10"/>
   </p:handoutMasterIdLst>
   <p:sldIdLst>
     <p:sldId id="269" r:id="rId6"/>
     <p:sldId id="271" r:id="rId7"/>
+    <p:sldId id="272" r:id="rId8"/>
   </p:sldIdLst>
   <p:sldSz cx="12192000" cy="6858000"/>
   <p:notesSz cx="6858000" cy="9144000"/>
@@ -5112,6 +5113,15 @@
               <a:rPr lang="en-US" dirty="0" smtClean="0"/>
               <a:t>Number of layers </a:t>
             </a:r>
+            <a:endParaRPr lang="en-US" dirty="0" smtClean="0"/>
+          </a:p>
+          <a:p>
+            <a:pPr lvl="1"/>
+            <a:r>
+              <a:rPr lang="en-US" dirty="0" smtClean="0"/>
+              <a:t>Dropout ratio</a:t>
+            </a:r>
+            <a:endParaRPr lang="en-US" dirty="0" smtClean="0"/>
           </a:p>
           <a:p>
             <a:r>
@@ -5129,9 +5139,23 @@
           <a:p>
             <a:pPr lvl="1"/>
             <a:r>
-              <a:rPr lang="en-US" smtClean="0"/>
-              <a:t>Learning rate </a:t>
-            </a:r>
+              <a:rPr lang="en-US" dirty="0" smtClean="0"/>
+              <a:t>Learning </a:t>
+            </a:r>
+            <a:r>
+              <a:rPr lang="en-US" dirty="0" smtClean="0"/>
+              <a:t>rate</a:t>
+            </a:r>
+          </a:p>
+          <a:p>
+            <a:pPr lvl="1"/>
+            <a:r>
+              <a:rPr lang="en-US" dirty="0" smtClean="0"/>
+              <a:t>Minimum result validation set </a:t>
+            </a:r>
+          </a:p>
+          <a:p>
+            <a:endParaRPr lang="en-US" dirty="0" smtClean="0"/>
           </a:p>
           <a:p>
             <a:pPr lvl="1"/>
@@ -5212,6 +5236,112 @@
     <p:extLst>
       <p:ext uri="{BB962C8B-B14F-4D97-AF65-F5344CB8AC3E}">
         <p14:creationId xmlns:p14="http://schemas.microsoft.com/office/powerpoint/2010/main" val="2280670844"/>
+      </p:ext>
+    </p:extLst>
+  </p:cSld>
+  <p:clrMapOvr>
+    <a:masterClrMapping/>
+  </p:clrMapOvr>
+</p:sld>
+</file>
+
+<file path=ppt/slides/slide3.xml><?xml version="1.0" encoding="utf-8"?>
+<p:sld xmlns:a="http://schemas.openxmlformats.org/drawingml/2006/main" xmlns:r="http://schemas.openxmlformats.org/officeDocument/2006/relationships" xmlns:p="http://schemas.openxmlformats.org/presentationml/2006/main">
+  <p:cSld>
+    <p:spTree>
+      <p:nvGrpSpPr>
+        <p:cNvPr id="1" name=""/>
+        <p:cNvGrpSpPr/>
+        <p:nvPr/>
+      </p:nvGrpSpPr>
+      <p:grpSpPr>
+        <a:xfrm>
+          <a:off x="0" y="0"/>
+          <a:ext cx="0" cy="0"/>
+          <a:chOff x="0" y="0"/>
+          <a:chExt cx="0" cy="0"/>
+        </a:xfrm>
+      </p:grpSpPr>
+      <p:sp>
+        <p:nvSpPr>
+          <p:cNvPr id="2" name="Footer Placeholder 1"/>
+          <p:cNvSpPr>
+            <a:spLocks noGrp="1"/>
+          </p:cNvSpPr>
+          <p:nvPr>
+            <p:ph type="ftr" sz="quarter" idx="11"/>
+          </p:nvPr>
+        </p:nvSpPr>
+        <p:spPr/>
+        <p:txBody>
+          <a:bodyPr/>
+          <a:lstStyle/>
+          <a:p>
+            <a:r>
+              <a:rPr lang="nl-NL" smtClean="0"/>
+              <a:t>Ingenieurswetenschappen, Werktuigkunde, TME</a:t>
+            </a:r>
+            <a:endParaRPr lang="nl-NL"/>
+          </a:p>
+        </p:txBody>
+      </p:sp>
+      <p:sp>
+        <p:nvSpPr>
+          <p:cNvPr id="3" name="Slide Number Placeholder 2"/>
+          <p:cNvSpPr>
+            <a:spLocks noGrp="1"/>
+          </p:cNvSpPr>
+          <p:nvPr>
+            <p:ph type="sldNum" sz="quarter" idx="12"/>
+          </p:nvPr>
+        </p:nvSpPr>
+        <p:spPr/>
+        <p:txBody>
+          <a:bodyPr/>
+          <a:lstStyle/>
+          <a:p>
+            <a:fld id="{0A297500-7527-634B-90F4-69D0994C32B4}" type="slidenum">
+              <a:rPr lang="nl-NL" smtClean="0"/>
+              <a:t>3</a:t>
+            </a:fld>
+            <a:endParaRPr lang="nl-NL"/>
+          </a:p>
+        </p:txBody>
+      </p:sp>
+      <p:pic>
+        <p:nvPicPr>
+          <p:cNvPr id="4" name="Picture 3"/>
+          <p:cNvPicPr>
+            <a:picLocks noChangeAspect="1"/>
+          </p:cNvPicPr>
+          <p:nvPr/>
+        </p:nvPicPr>
+        <p:blipFill>
+          <a:blip r:embed="rId2">
+            <a:extLst>
+              <a:ext uri="{28A0092B-C50C-407E-A947-70E740481C1C}">
+                <a14:useLocalDpi xmlns:a14="http://schemas.microsoft.com/office/drawing/2010/main" val="0"/>
+              </a:ext>
+            </a:extLst>
+          </a:blip>
+          <a:stretch>
+            <a:fillRect/>
+          </a:stretch>
+        </p:blipFill>
+        <p:spPr>
+          <a:xfrm>
+            <a:off x="758283" y="115326"/>
+            <a:ext cx="10283407" cy="5782439"/>
+          </a:xfrm>
+          <a:prstGeom prst="rect">
+            <a:avLst/>
+          </a:prstGeom>
+        </p:spPr>
+      </p:pic>
+    </p:spTree>
+    <p:extLst>
+      <p:ext uri="{BB962C8B-B14F-4D97-AF65-F5344CB8AC3E}">
+        <p14:creationId xmlns:p14="http://schemas.microsoft.com/office/powerpoint/2010/main" val="261656653"/>
       </p:ext>
     </p:extLst>
   </p:cSld>

</xml_diff>